<commit_message>
read me finialized with minor tweeks to music news
</commit_message>
<xml_diff>
--- a/Intuitive Banana.pptx
+++ b/Intuitive Banana.pptx
@@ -111,6 +111,11 @@
       </a:defRPr>
     </a:lvl9pPr>
   </p:defaultTextStyle>
+  <p:extLst>
+    <p:ext uri="{EFAFB233-063F-42B5-8137-9DF3F51BA10A}">
+      <p15:sldGuideLst xmlns:p15="http://schemas.microsoft.com/office/powerpoint/2012/main"/>
+    </p:ext>
+  </p:extLst>
 </p:presentation>
 </file>
 
@@ -299,7 +304,7 @@
           <a:p>
             <a:fld id="{88D38747-4367-4BD2-8D51-C97E202738E2}" type="datetime1">
               <a:rPr lang="en-US" smtClean="0"/>
-              <a:t>12/3/19</a:t>
+              <a:t>12/4/19</a:t>
             </a:fld>
             <a:endParaRPr lang="en-US" dirty="0"/>
           </a:p>
@@ -604,7 +609,7 @@
           <a:p>
             <a:fld id="{11F1B079-7EF0-44EE-B798-BCC497C9F3B2}" type="datetime1">
               <a:rPr lang="en-US" smtClean="0"/>
-              <a:t>12/3/19</a:t>
+              <a:t>12/4/19</a:t>
             </a:fld>
             <a:endParaRPr lang="en-US" dirty="0"/>
           </a:p>
@@ -798,7 +803,7 @@
           <a:p>
             <a:fld id="{28FF70A8-1D13-4657-95F0-A9EA54967B8D}" type="datetime1">
               <a:rPr lang="en-US" smtClean="0"/>
-              <a:t>12/3/19</a:t>
+              <a:t>12/4/19</a:t>
             </a:fld>
             <a:endParaRPr lang="en-US" dirty="0"/>
           </a:p>
@@ -1061,7 +1066,7 @@
           <a:p>
             <a:fld id="{21EB90AC-71BD-4C7F-8ACA-7B3F18292E63}" type="datetime1">
               <a:rPr lang="en-US" smtClean="0"/>
-              <a:t>12/3/19</a:t>
+              <a:t>12/4/19</a:t>
             </a:fld>
             <a:endParaRPr lang="en-US" dirty="0"/>
           </a:p>
@@ -1497,7 +1502,7 @@
           <a:p>
             <a:fld id="{4E6EFC2C-8905-46F0-B443-CE905B76BA01}" type="datetime1">
               <a:rPr lang="en-US" smtClean="0"/>
-              <a:t>12/3/19</a:t>
+              <a:t>12/4/19</a:t>
             </a:fld>
             <a:endParaRPr lang="en-US" dirty="0"/>
           </a:p>
@@ -2034,7 +2039,7 @@
           <a:p>
             <a:fld id="{D9079DC3-C9B5-499E-9140-0DC28B7074E2}" type="datetime1">
               <a:rPr lang="en-US" smtClean="0"/>
-              <a:t>12/3/19</a:t>
+              <a:t>12/4/19</a:t>
             </a:fld>
             <a:endParaRPr lang="en-US" dirty="0"/>
           </a:p>
@@ -2916,7 +2921,7 @@
           <a:p>
             <a:fld id="{30BB33EA-E472-4D22-9C03-A9C14AA21CED}" type="datetime1">
               <a:rPr lang="en-US" smtClean="0"/>
-              <a:t>12/3/19</a:t>
+              <a:t>12/4/19</a:t>
             </a:fld>
             <a:endParaRPr lang="en-US" dirty="0"/>
           </a:p>
@@ -3086,7 +3091,7 @@
           <a:p>
             <a:fld id="{217E833E-1B6D-415F-AD29-75AE8C43BD0D}" type="datetime1">
               <a:rPr lang="en-US" smtClean="0"/>
-              <a:t>12/3/19</a:t>
+              <a:t>12/4/19</a:t>
             </a:fld>
             <a:endParaRPr lang="en-US" dirty="0"/>
           </a:p>
@@ -3270,7 +3275,7 @@
           <a:p>
             <a:fld id="{8452596F-08A7-4B70-989A-F2B1CF31E66B}" type="datetime1">
               <a:rPr lang="en-US" smtClean="0"/>
-              <a:t>12/3/19</a:t>
+              <a:t>12/4/19</a:t>
             </a:fld>
             <a:endParaRPr lang="en-US" dirty="0"/>
           </a:p>
@@ -3440,7 +3445,7 @@
           <a:p>
             <a:fld id="{73C55A3C-5767-4844-A0A3-83778C2E5409}" type="datetime1">
               <a:rPr lang="en-US" smtClean="0"/>
-              <a:t>12/3/19</a:t>
+              <a:t>12/4/19</a:t>
             </a:fld>
             <a:endParaRPr lang="en-US" dirty="0"/>
           </a:p>
@@ -3684,7 +3689,7 @@
           <a:p>
             <a:fld id="{CAE507A8-A5CF-4D38-AB86-7EDDA87A85D4}" type="datetime1">
               <a:rPr lang="en-US" smtClean="0"/>
-              <a:t>12/3/19</a:t>
+              <a:t>12/4/19</a:t>
             </a:fld>
             <a:endParaRPr lang="en-US" dirty="0"/>
           </a:p>
@@ -3926,7 +3931,7 @@
           <a:p>
             <a:fld id="{BDFCD27C-8599-43EF-BA1D-14DDC1946E06}" type="datetime1">
               <a:rPr lang="en-US" smtClean="0"/>
-              <a:t>12/3/19</a:t>
+              <a:t>12/4/19</a:t>
             </a:fld>
             <a:endParaRPr lang="en-US" dirty="0"/>
           </a:p>
@@ -4407,7 +4412,7 @@
           <a:p>
             <a:fld id="{49343D99-809A-49C0-96E5-4250D0B498EE}" type="datetime1">
               <a:rPr lang="en-US" smtClean="0"/>
-              <a:t>12/3/19</a:t>
+              <a:t>12/4/19</a:t>
             </a:fld>
             <a:endParaRPr lang="en-US" dirty="0"/>
           </a:p>
@@ -4525,7 +4530,7 @@
           <a:p>
             <a:fld id="{A143DE9B-B678-4EFB-BB7D-A4370204A0B0}" type="datetime1">
               <a:rPr lang="en-US" smtClean="0"/>
-              <a:t>12/3/19</a:t>
+              <a:t>12/4/19</a:t>
             </a:fld>
             <a:endParaRPr lang="en-US" dirty="0"/>
           </a:p>
@@ -4620,7 +4625,7 @@
           <a:p>
             <a:fld id="{E68812DA-F765-4142-A6A3-A8ED7235E082}" type="datetime1">
               <a:rPr lang="en-US" smtClean="0"/>
-              <a:t>12/3/19</a:t>
+              <a:t>12/4/19</a:t>
             </a:fld>
             <a:endParaRPr lang="en-US" dirty="0"/>
           </a:p>
@@ -4875,7 +4880,7 @@
           <a:p>
             <a:fld id="{3E0277FD-7DE6-41D4-930D-AC99F5AFE54E}" type="datetime1">
               <a:rPr lang="en-US" smtClean="0"/>
-              <a:t>12/3/19</a:t>
+              <a:t>12/4/19</a:t>
             </a:fld>
             <a:endParaRPr lang="en-US" dirty="0"/>
           </a:p>
@@ -5182,7 +5187,7 @@
           <a:p>
             <a:fld id="{9EA15526-7079-4B7B-987C-1B5FAE11A0FF}" type="datetime1">
               <a:rPr lang="en-US" smtClean="0"/>
-              <a:t>12/3/19</a:t>
+              <a:t>12/4/19</a:t>
             </a:fld>
             <a:endParaRPr lang="en-US" dirty="0"/>
           </a:p>
@@ -5417,7 +5422,7 @@
           <a:p>
             <a:fld id="{073ED0CC-082F-4160-86E5-0D6041F12778}" type="datetime1">
               <a:rPr lang="en-US" smtClean="0"/>
-              <a:t>12/3/19</a:t>
+              <a:t>12/4/19</a:t>
             </a:fld>
             <a:endParaRPr lang="en-US" dirty="0"/>
           </a:p>
@@ -6192,7 +6197,7 @@
           </a:effectLst>
           <a:extLst>
             <a:ext uri="{91240B29-F687-4f45-9708-019B960494DF}">
-              <a14:hiddenLine xmlns="" xmlns:a16="http://schemas.microsoft.com/office/drawing/2014/main" xmlns:p14="http://schemas.microsoft.com/office/powerpoint/2010/main" xmlns:a14="http://schemas.microsoft.com/office/drawing/2010/main" w="9525">
+              <a14:hiddenLine xmlns:a14="http://schemas.microsoft.com/office/drawing/2010/main" xmlns:p14="http://schemas.microsoft.com/office/powerpoint/2010/main" xmlns:a16="http://schemas.microsoft.com/office/drawing/2014/main" xmlns="" w="9525">
                 <a:solidFill>
                   <a:srgbClr val="000000"/>
                 </a:solidFill>
@@ -9147,11 +9152,28 @@
           <a:p>
             <a:r>
               <a:rPr lang="en-US" dirty="0">
-                <a:latin typeface="Calibri" panose="020F0502020204030204" pitchFamily="34" charset="0"/>
-                <a:cs typeface="Calibri" panose="020F0502020204030204" pitchFamily="34" charset="0"/>
+                <a:solidFill>
+                  <a:schemeClr val="tx1"/>
+                </a:solidFill>
+                <a:latin typeface="Calibri Light" panose="020F0302020204030204" pitchFamily="34" charset="0"/>
+                <a:cs typeface="Calibri Light" panose="020F0302020204030204" pitchFamily="34" charset="0"/>
+                <a:hlinkClick r:id="rId4">
+                  <a:extLst>
+                    <a:ext uri="{A12FA001-AC4F-418D-AE19-62706E023703}">
+                      <ahyp:hlinkClr xmlns:ahyp="http://schemas.microsoft.com/office/drawing/2018/hyperlinkcolor" val="tx"/>
+                    </a:ext>
+                  </a:extLst>
+                </a:hlinkClick>
               </a:rPr>
               <a:t>Demo</a:t>
             </a:r>
+            <a:endParaRPr lang="en-US" dirty="0">
+              <a:solidFill>
+                <a:schemeClr val="tx1"/>
+              </a:solidFill>
+              <a:latin typeface="Calibri Light" panose="020F0302020204030204" pitchFamily="34" charset="0"/>
+              <a:cs typeface="Calibri Light" panose="020F0302020204030204" pitchFamily="34" charset="0"/>
+            </a:endParaRPr>
           </a:p>
         </p:txBody>
       </p:sp>
@@ -10178,6 +10200,12 @@
                     </a:schemeClr>
                   </a:solidFill>
                 </a:ln>
+                <a:solidFill>
+                  <a:schemeClr val="bg1">
+                    <a:lumMod val="50000"/>
+                    <a:lumOff val="50000"/>
+                  </a:schemeClr>
+                </a:solidFill>
                 <a:effectLst>
                   <a:outerShdw blurRad="9525" dist="25400" dir="14640000" algn="tl" rotWithShape="0">
                     <a:schemeClr val="bg1">
@@ -10187,7 +10215,13 @@
                 </a:effectLst>
                 <a:latin typeface="Calibri" panose="020F0502020204030204" pitchFamily="34" charset="0"/>
                 <a:cs typeface="Calibri" panose="020F0502020204030204" pitchFamily="34" charset="0"/>
-                <a:hlinkClick r:id="rId3"/>
+                <a:hlinkClick r:id="rId3">
+                  <a:extLst>
+                    <a:ext uri="{A12FA001-AC4F-418D-AE19-62706E023703}">
+                      <ahyp:hlinkClr xmlns:ahyp="http://schemas.microsoft.com/office/drawing/2018/hyperlinkcolor" val="tx"/>
+                    </a:ext>
+                  </a:extLst>
+                </a:hlinkClick>
               </a:rPr>
               <a:t>https://github.com/DrBailey13/IntuitiveBanana</a:t>
             </a:r>
@@ -10201,6 +10235,12 @@
                   </a:schemeClr>
                 </a:solidFill>
               </a:ln>
+              <a:solidFill>
+                <a:schemeClr val="bg1">
+                  <a:lumMod val="50000"/>
+                  <a:lumOff val="50000"/>
+                </a:schemeClr>
+              </a:solidFill>
               <a:effectLst>
                 <a:outerShdw blurRad="9525" dist="25400" dir="14640000" algn="tl" rotWithShape="0">
                   <a:schemeClr val="bg1">
@@ -10283,47 +10323,34 @@
               <a:buChar char="•"/>
             </a:pPr>
             <a:r>
-              <a:rPr lang="en-US" sz="2000" dirty="0">
-                <a:ln>
-                  <a:solidFill>
-                    <a:schemeClr val="bg1">
-                      <a:lumMod val="75000"/>
-                      <a:lumOff val="25000"/>
-                      <a:alpha val="10000"/>
-                    </a:schemeClr>
-                  </a:solidFill>
-                </a:ln>
-                <a:effectLst>
-                  <a:outerShdw blurRad="9525" dist="25400" dir="14640000" algn="tl" rotWithShape="0">
-                    <a:schemeClr val="bg1">
-                      <a:alpha val="30000"/>
-                    </a:schemeClr>
-                  </a:outerShdw>
-                </a:effectLst>
-                <a:latin typeface="Calibri" panose="020F0502020204030204" pitchFamily="34" charset="0"/>
-                <a:cs typeface="Calibri" panose="020F0502020204030204" pitchFamily="34" charset="0"/>
-              </a:rPr>
-              <a:t>https://</a:t>
-            </a:r>
-            <a:endParaRPr lang="en-US" sz="2800" dirty="0">
-              <a:ln>
+              <a:rPr lang="en-US" dirty="0">
                 <a:solidFill>
                   <a:schemeClr val="bg1">
-                    <a:lumMod val="75000"/>
-                    <a:lumOff val="25000"/>
-                    <a:alpha val="10000"/>
+                    <a:lumMod val="50000"/>
+                    <a:lumOff val="50000"/>
                   </a:schemeClr>
                 </a:solidFill>
-              </a:ln>
-              <a:effectLst>
-                <a:outerShdw blurRad="9525" dist="25400" dir="14640000" algn="tl" rotWithShape="0">
-                  <a:schemeClr val="bg1">
-                    <a:alpha val="30000"/>
-                  </a:schemeClr>
-                </a:outerShdw>
-              </a:effectLst>
-              <a:latin typeface="Calibri" panose="020F0502020204030204" pitchFamily="34" charset="0"/>
-              <a:cs typeface="Calibri" panose="020F0502020204030204" pitchFamily="34" charset="0"/>
+                <a:latin typeface="Calibri Light" panose="020F0302020204030204" pitchFamily="34" charset="0"/>
+                <a:cs typeface="Calibri Light" panose="020F0302020204030204" pitchFamily="34" charset="0"/>
+                <a:hlinkClick r:id="rId4">
+                  <a:extLst>
+                    <a:ext uri="{A12FA001-AC4F-418D-AE19-62706E023703}">
+                      <ahyp:hlinkClr xmlns:ahyp="http://schemas.microsoft.com/office/drawing/2018/hyperlinkcolor" val="tx"/>
+                    </a:ext>
+                  </a:extLst>
+                </a:hlinkClick>
+              </a:rPr>
+              <a:t>https://drbailey13.github.io/IntuitiveBanana/index.html</a:t>
+            </a:r>
+            <a:endParaRPr lang="en-US" dirty="0">
+              <a:solidFill>
+                <a:schemeClr val="bg1">
+                  <a:lumMod val="50000"/>
+                  <a:lumOff val="50000"/>
+                </a:schemeClr>
+              </a:solidFill>
+              <a:latin typeface="Calibri Light" panose="020F0302020204030204" pitchFamily="34" charset="0"/>
+              <a:cs typeface="Calibri Light" panose="020F0302020204030204" pitchFamily="34" charset="0"/>
             </a:endParaRPr>
           </a:p>
         </p:txBody>

</xml_diff>